<commit_message>
moving presentation into presentation folder (duh!)
</commit_message>
<xml_diff>
--- a/documents/presentations/Team_Mercury_ArchDesign_Technical_Presentation_Fall_2013.pptx
+++ b/documents/presentations/Team_Mercury_ArchDesign_Technical_Presentation_Fall_2013.pptx
@@ -3548,7 +3548,7 @@
   <dgm:whole/>
   <dgm:extLst>
     <a:ext uri="http://schemas.microsoft.com/office/drawing/2008/diagram">
-      <dsp:dataModelExt xmlns:dsp="http://schemas.microsoft.com/office/drawing/2008/diagram" relId="rId7" minVer="http://schemas.openxmlformats.org/drawingml/2006/diagram"/>
+      <dsp:dataModelExt xmlns:dsp="http://schemas.microsoft.com/office/drawing/2008/diagram" relId="rId6" minVer="http://schemas.openxmlformats.org/drawingml/2006/diagram"/>
     </a:ext>
     <a:ext uri="{C62137D5-CB1D-491B-B009-E17868A290BF}">
       <dgm14:recolorImg xmlns:dgm14="http://schemas.microsoft.com/office/drawing/2010/diagram" val="1"/>
@@ -3934,7 +3934,7 @@
   <dgm:whole/>
   <dgm:extLst>
     <a:ext uri="http://schemas.microsoft.com/office/drawing/2008/diagram">
-      <dsp:dataModelExt xmlns:dsp="http://schemas.microsoft.com/office/drawing/2008/diagram" relId="rId7" minVer="http://schemas.openxmlformats.org/drawingml/2006/diagram"/>
+      <dsp:dataModelExt xmlns:dsp="http://schemas.microsoft.com/office/drawing/2008/diagram" relId="rId6" minVer="http://schemas.openxmlformats.org/drawingml/2006/diagram"/>
     </a:ext>
     <a:ext uri="{C62137D5-CB1D-491B-B009-E17868A290BF}">
       <dgm14:recolorImg xmlns:dgm14="http://schemas.microsoft.com/office/drawing/2010/diagram" val="1"/>
@@ -4320,7 +4320,7 @@
   <dgm:whole/>
   <dgm:extLst>
     <a:ext uri="http://schemas.microsoft.com/office/drawing/2008/diagram">
-      <dsp:dataModelExt xmlns:dsp="http://schemas.microsoft.com/office/drawing/2008/diagram" relId="rId7" minVer="http://schemas.openxmlformats.org/drawingml/2006/diagram"/>
+      <dsp:dataModelExt xmlns:dsp="http://schemas.microsoft.com/office/drawing/2008/diagram" relId="rId6" minVer="http://schemas.openxmlformats.org/drawingml/2006/diagram"/>
     </a:ext>
     <a:ext uri="{C62137D5-CB1D-491B-B009-E17868A290BF}">
       <dgm14:recolorImg xmlns:dgm14="http://schemas.microsoft.com/office/drawing/2010/diagram" val="1"/>
@@ -4834,7 +4834,7 @@
   <dgm:whole/>
   <dgm:extLst>
     <a:ext uri="http://schemas.microsoft.com/office/drawing/2008/diagram">
-      <dsp:dataModelExt xmlns:dsp="http://schemas.microsoft.com/office/drawing/2008/diagram" relId="rId7" minVer="http://schemas.openxmlformats.org/drawingml/2006/diagram"/>
+      <dsp:dataModelExt xmlns:dsp="http://schemas.microsoft.com/office/drawing/2008/diagram" relId="rId6" minVer="http://schemas.openxmlformats.org/drawingml/2006/diagram"/>
     </a:ext>
   </dgm:extLst>
 </dgm:dataModel>
@@ -12516,1986 +12516,6 @@
 </p:notes>
 </file>
 
-<file path=ppt/notesSlides/notesSlide10.xml><?xml version="1.0" encoding="utf-8"?>
-<p:notes xmlns:a="http://schemas.openxmlformats.org/drawingml/2006/main" xmlns:r="http://schemas.openxmlformats.org/officeDocument/2006/relationships" xmlns:p="http://schemas.openxmlformats.org/presentationml/2006/main">
-  <p:cSld>
-    <p:spTree>
-      <p:nvGrpSpPr>
-        <p:cNvPr id="1" name=""/>
-        <p:cNvGrpSpPr/>
-        <p:nvPr/>
-      </p:nvGrpSpPr>
-      <p:grpSpPr>
-        <a:xfrm>
-          <a:off x="0" y="0"/>
-          <a:ext cx="0" cy="0"/>
-          <a:chOff x="0" y="0"/>
-          <a:chExt cx="0" cy="0"/>
-        </a:xfrm>
-      </p:grpSpPr>
-      <p:sp>
-        <p:nvSpPr>
-          <p:cNvPr id="2" name="Slide Image Placeholder 1"/>
-          <p:cNvSpPr>
-            <a:spLocks noGrp="1" noRot="1" noChangeAspect="1"/>
-          </p:cNvSpPr>
-          <p:nvPr>
-            <p:ph type="sldImg"/>
-          </p:nvPr>
-        </p:nvSpPr>
-        <p:spPr/>
-      </p:sp>
-      <p:sp>
-        <p:nvSpPr>
-          <p:cNvPr id="3" name="Notes Placeholder 2"/>
-          <p:cNvSpPr>
-            <a:spLocks noGrp="1"/>
-          </p:cNvSpPr>
-          <p:nvPr>
-            <p:ph type="body" idx="1"/>
-          </p:nvPr>
-        </p:nvSpPr>
-        <p:spPr/>
-        <p:txBody>
-          <a:bodyPr/>
-          <a:lstStyle/>
-          <a:p>
-            <a:endParaRPr lang="en-US"/>
-          </a:p>
-        </p:txBody>
-      </p:sp>
-      <p:sp>
-        <p:nvSpPr>
-          <p:cNvPr id="4" name="Slide Number Placeholder 3"/>
-          <p:cNvSpPr>
-            <a:spLocks noGrp="1"/>
-          </p:cNvSpPr>
-          <p:nvPr>
-            <p:ph type="sldNum" sz="quarter" idx="10"/>
-          </p:nvPr>
-        </p:nvSpPr>
-        <p:spPr/>
-        <p:txBody>
-          <a:bodyPr/>
-          <a:lstStyle/>
-          <a:p>
-            <a:pPr>
-              <a:defRPr/>
-            </a:pPr>
-            <a:fld id="{4881675A-82DA-48EF-9B86-3CC2752D2CAE}" type="slidenum">
-              <a:rPr lang="en-US" smtClean="0"/>
-              <a:pPr>
-                <a:defRPr/>
-              </a:pPr>
-              <a:t>10</a:t>
-            </a:fld>
-            <a:endParaRPr lang="en-US" dirty="0"/>
-          </a:p>
-        </p:txBody>
-      </p:sp>
-    </p:spTree>
-    <p:extLst>
-      <p:ext uri="{BB962C8B-B14F-4D97-AF65-F5344CB8AC3E}">
-        <p14:creationId xmlns:p14="http://schemas.microsoft.com/office/powerpoint/2010/main" val="2446980528"/>
-      </p:ext>
-    </p:extLst>
-  </p:cSld>
-  <p:clrMapOvr>
-    <a:masterClrMapping/>
-  </p:clrMapOvr>
-</p:notes>
-</file>
-
-<file path=ppt/notesSlides/notesSlide11.xml><?xml version="1.0" encoding="utf-8"?>
-<p:notes xmlns:a="http://schemas.openxmlformats.org/drawingml/2006/main" xmlns:r="http://schemas.openxmlformats.org/officeDocument/2006/relationships" xmlns:p="http://schemas.openxmlformats.org/presentationml/2006/main">
-  <p:cSld>
-    <p:spTree>
-      <p:nvGrpSpPr>
-        <p:cNvPr id="1" name=""/>
-        <p:cNvGrpSpPr/>
-        <p:nvPr/>
-      </p:nvGrpSpPr>
-      <p:grpSpPr>
-        <a:xfrm>
-          <a:off x="0" y="0"/>
-          <a:ext cx="0" cy="0"/>
-          <a:chOff x="0" y="0"/>
-          <a:chExt cx="0" cy="0"/>
-        </a:xfrm>
-      </p:grpSpPr>
-      <p:sp>
-        <p:nvSpPr>
-          <p:cNvPr id="2" name="Slide Image Placeholder 1"/>
-          <p:cNvSpPr>
-            <a:spLocks noGrp="1" noRot="1" noChangeAspect="1"/>
-          </p:cNvSpPr>
-          <p:nvPr>
-            <p:ph type="sldImg"/>
-          </p:nvPr>
-        </p:nvSpPr>
-        <p:spPr/>
-      </p:sp>
-      <p:sp>
-        <p:nvSpPr>
-          <p:cNvPr id="3" name="Notes Placeholder 2"/>
-          <p:cNvSpPr>
-            <a:spLocks noGrp="1"/>
-          </p:cNvSpPr>
-          <p:nvPr>
-            <p:ph type="body" idx="1"/>
-          </p:nvPr>
-        </p:nvSpPr>
-        <p:spPr/>
-        <p:txBody>
-          <a:bodyPr/>
-          <a:lstStyle/>
-          <a:p>
-            <a:endParaRPr lang="en-US"/>
-          </a:p>
-        </p:txBody>
-      </p:sp>
-      <p:sp>
-        <p:nvSpPr>
-          <p:cNvPr id="4" name="Slide Number Placeholder 3"/>
-          <p:cNvSpPr>
-            <a:spLocks noGrp="1"/>
-          </p:cNvSpPr>
-          <p:nvPr>
-            <p:ph type="sldNum" sz="quarter" idx="10"/>
-          </p:nvPr>
-        </p:nvSpPr>
-        <p:spPr/>
-        <p:txBody>
-          <a:bodyPr/>
-          <a:lstStyle/>
-          <a:p>
-            <a:pPr>
-              <a:defRPr/>
-            </a:pPr>
-            <a:fld id="{4881675A-82DA-48EF-9B86-3CC2752D2CAE}" type="slidenum">
-              <a:rPr lang="en-US" smtClean="0"/>
-              <a:pPr>
-                <a:defRPr/>
-              </a:pPr>
-              <a:t>11</a:t>
-            </a:fld>
-            <a:endParaRPr lang="en-US" dirty="0"/>
-          </a:p>
-        </p:txBody>
-      </p:sp>
-    </p:spTree>
-    <p:extLst>
-      <p:ext uri="{BB962C8B-B14F-4D97-AF65-F5344CB8AC3E}">
-        <p14:creationId xmlns:p14="http://schemas.microsoft.com/office/powerpoint/2010/main" val="1925521405"/>
-      </p:ext>
-    </p:extLst>
-  </p:cSld>
-  <p:clrMapOvr>
-    <a:masterClrMapping/>
-  </p:clrMapOvr>
-</p:notes>
-</file>
-
-<file path=ppt/notesSlides/notesSlide12.xml><?xml version="1.0" encoding="utf-8"?>
-<p:notes xmlns:a="http://schemas.openxmlformats.org/drawingml/2006/main" xmlns:r="http://schemas.openxmlformats.org/officeDocument/2006/relationships" xmlns:p="http://schemas.openxmlformats.org/presentationml/2006/main">
-  <p:cSld>
-    <p:spTree>
-      <p:nvGrpSpPr>
-        <p:cNvPr id="1" name=""/>
-        <p:cNvGrpSpPr/>
-        <p:nvPr/>
-      </p:nvGrpSpPr>
-      <p:grpSpPr>
-        <a:xfrm>
-          <a:off x="0" y="0"/>
-          <a:ext cx="0" cy="0"/>
-          <a:chOff x="0" y="0"/>
-          <a:chExt cx="0" cy="0"/>
-        </a:xfrm>
-      </p:grpSpPr>
-      <p:sp>
-        <p:nvSpPr>
-          <p:cNvPr id="2" name="Slide Image Placeholder 1"/>
-          <p:cNvSpPr>
-            <a:spLocks noGrp="1" noRot="1" noChangeAspect="1"/>
-          </p:cNvSpPr>
-          <p:nvPr>
-            <p:ph type="sldImg"/>
-          </p:nvPr>
-        </p:nvSpPr>
-        <p:spPr/>
-      </p:sp>
-      <p:sp>
-        <p:nvSpPr>
-          <p:cNvPr id="3" name="Notes Placeholder 2"/>
-          <p:cNvSpPr>
-            <a:spLocks noGrp="1"/>
-          </p:cNvSpPr>
-          <p:nvPr>
-            <p:ph type="body" idx="1"/>
-          </p:nvPr>
-        </p:nvSpPr>
-        <p:spPr/>
-        <p:txBody>
-          <a:bodyPr/>
-          <a:lstStyle/>
-          <a:p>
-            <a:endParaRPr lang="en-US"/>
-          </a:p>
-        </p:txBody>
-      </p:sp>
-      <p:sp>
-        <p:nvSpPr>
-          <p:cNvPr id="4" name="Slide Number Placeholder 3"/>
-          <p:cNvSpPr>
-            <a:spLocks noGrp="1"/>
-          </p:cNvSpPr>
-          <p:nvPr>
-            <p:ph type="sldNum" sz="quarter" idx="10"/>
-          </p:nvPr>
-        </p:nvSpPr>
-        <p:spPr/>
-        <p:txBody>
-          <a:bodyPr/>
-          <a:lstStyle/>
-          <a:p>
-            <a:pPr>
-              <a:defRPr/>
-            </a:pPr>
-            <a:fld id="{4881675A-82DA-48EF-9B86-3CC2752D2CAE}" type="slidenum">
-              <a:rPr lang="en-US" smtClean="0"/>
-              <a:pPr>
-                <a:defRPr/>
-              </a:pPr>
-              <a:t>12</a:t>
-            </a:fld>
-            <a:endParaRPr lang="en-US" dirty="0"/>
-          </a:p>
-        </p:txBody>
-      </p:sp>
-    </p:spTree>
-    <p:extLst>
-      <p:ext uri="{BB962C8B-B14F-4D97-AF65-F5344CB8AC3E}">
-        <p14:creationId xmlns:p14="http://schemas.microsoft.com/office/powerpoint/2010/main" val="2539195244"/>
-      </p:ext>
-    </p:extLst>
-  </p:cSld>
-  <p:clrMapOvr>
-    <a:masterClrMapping/>
-  </p:clrMapOvr>
-</p:notes>
-</file>
-
-<file path=ppt/notesSlides/notesSlide13.xml><?xml version="1.0" encoding="utf-8"?>
-<p:notes xmlns:a="http://schemas.openxmlformats.org/drawingml/2006/main" xmlns:r="http://schemas.openxmlformats.org/officeDocument/2006/relationships" xmlns:p="http://schemas.openxmlformats.org/presentationml/2006/main">
-  <p:cSld>
-    <p:spTree>
-      <p:nvGrpSpPr>
-        <p:cNvPr id="1" name=""/>
-        <p:cNvGrpSpPr/>
-        <p:nvPr/>
-      </p:nvGrpSpPr>
-      <p:grpSpPr>
-        <a:xfrm>
-          <a:off x="0" y="0"/>
-          <a:ext cx="0" cy="0"/>
-          <a:chOff x="0" y="0"/>
-          <a:chExt cx="0" cy="0"/>
-        </a:xfrm>
-      </p:grpSpPr>
-      <p:sp>
-        <p:nvSpPr>
-          <p:cNvPr id="2" name="Slide Image Placeholder 1"/>
-          <p:cNvSpPr>
-            <a:spLocks noGrp="1" noRot="1" noChangeAspect="1"/>
-          </p:cNvSpPr>
-          <p:nvPr>
-            <p:ph type="sldImg"/>
-          </p:nvPr>
-        </p:nvSpPr>
-        <p:spPr/>
-      </p:sp>
-      <p:sp>
-        <p:nvSpPr>
-          <p:cNvPr id="3" name="Notes Placeholder 2"/>
-          <p:cNvSpPr>
-            <a:spLocks noGrp="1"/>
-          </p:cNvSpPr>
-          <p:nvPr>
-            <p:ph type="body" idx="1"/>
-          </p:nvPr>
-        </p:nvSpPr>
-        <p:spPr/>
-        <p:txBody>
-          <a:bodyPr/>
-          <a:lstStyle/>
-          <a:p>
-            <a:endParaRPr lang="en-US"/>
-          </a:p>
-        </p:txBody>
-      </p:sp>
-      <p:sp>
-        <p:nvSpPr>
-          <p:cNvPr id="4" name="Slide Number Placeholder 3"/>
-          <p:cNvSpPr>
-            <a:spLocks noGrp="1"/>
-          </p:cNvSpPr>
-          <p:nvPr>
-            <p:ph type="sldNum" sz="quarter" idx="10"/>
-          </p:nvPr>
-        </p:nvSpPr>
-        <p:spPr/>
-        <p:txBody>
-          <a:bodyPr/>
-          <a:lstStyle/>
-          <a:p>
-            <a:pPr>
-              <a:defRPr/>
-            </a:pPr>
-            <a:fld id="{4881675A-82DA-48EF-9B86-3CC2752D2CAE}" type="slidenum">
-              <a:rPr lang="en-US" smtClean="0"/>
-              <a:pPr>
-                <a:defRPr/>
-              </a:pPr>
-              <a:t>13</a:t>
-            </a:fld>
-            <a:endParaRPr lang="en-US" dirty="0"/>
-          </a:p>
-        </p:txBody>
-      </p:sp>
-    </p:spTree>
-    <p:extLst>
-      <p:ext uri="{BB962C8B-B14F-4D97-AF65-F5344CB8AC3E}">
-        <p14:creationId xmlns:p14="http://schemas.microsoft.com/office/powerpoint/2010/main" val="1321830149"/>
-      </p:ext>
-    </p:extLst>
-  </p:cSld>
-  <p:clrMapOvr>
-    <a:masterClrMapping/>
-  </p:clrMapOvr>
-</p:notes>
-</file>
-
-<file path=ppt/notesSlides/notesSlide14.xml><?xml version="1.0" encoding="utf-8"?>
-<p:notes xmlns:a="http://schemas.openxmlformats.org/drawingml/2006/main" xmlns:r="http://schemas.openxmlformats.org/officeDocument/2006/relationships" xmlns:p="http://schemas.openxmlformats.org/presentationml/2006/main">
-  <p:cSld>
-    <p:spTree>
-      <p:nvGrpSpPr>
-        <p:cNvPr id="1" name=""/>
-        <p:cNvGrpSpPr/>
-        <p:nvPr/>
-      </p:nvGrpSpPr>
-      <p:grpSpPr>
-        <a:xfrm>
-          <a:off x="0" y="0"/>
-          <a:ext cx="0" cy="0"/>
-          <a:chOff x="0" y="0"/>
-          <a:chExt cx="0" cy="0"/>
-        </a:xfrm>
-      </p:grpSpPr>
-      <p:sp>
-        <p:nvSpPr>
-          <p:cNvPr id="2" name="Slide Image Placeholder 1"/>
-          <p:cNvSpPr>
-            <a:spLocks noGrp="1" noRot="1" noChangeAspect="1"/>
-          </p:cNvSpPr>
-          <p:nvPr>
-            <p:ph type="sldImg"/>
-          </p:nvPr>
-        </p:nvSpPr>
-        <p:spPr/>
-      </p:sp>
-      <p:sp>
-        <p:nvSpPr>
-          <p:cNvPr id="3" name="Notes Placeholder 2"/>
-          <p:cNvSpPr>
-            <a:spLocks noGrp="1"/>
-          </p:cNvSpPr>
-          <p:nvPr>
-            <p:ph type="body" idx="1"/>
-          </p:nvPr>
-        </p:nvSpPr>
-        <p:spPr/>
-        <p:txBody>
-          <a:bodyPr/>
-          <a:lstStyle/>
-          <a:p>
-            <a:endParaRPr lang="en-US"/>
-          </a:p>
-        </p:txBody>
-      </p:sp>
-      <p:sp>
-        <p:nvSpPr>
-          <p:cNvPr id="4" name="Slide Number Placeholder 3"/>
-          <p:cNvSpPr>
-            <a:spLocks noGrp="1"/>
-          </p:cNvSpPr>
-          <p:nvPr>
-            <p:ph type="sldNum" sz="quarter" idx="10"/>
-          </p:nvPr>
-        </p:nvSpPr>
-        <p:spPr/>
-        <p:txBody>
-          <a:bodyPr/>
-          <a:lstStyle/>
-          <a:p>
-            <a:pPr>
-              <a:defRPr/>
-            </a:pPr>
-            <a:fld id="{4881675A-82DA-48EF-9B86-3CC2752D2CAE}" type="slidenum">
-              <a:rPr lang="en-US" smtClean="0"/>
-              <a:pPr>
-                <a:defRPr/>
-              </a:pPr>
-              <a:t>14</a:t>
-            </a:fld>
-            <a:endParaRPr lang="en-US" dirty="0"/>
-          </a:p>
-        </p:txBody>
-      </p:sp>
-    </p:spTree>
-    <p:extLst>
-      <p:ext uri="{BB962C8B-B14F-4D97-AF65-F5344CB8AC3E}">
-        <p14:creationId xmlns:p14="http://schemas.microsoft.com/office/powerpoint/2010/main" val="4083141246"/>
-      </p:ext>
-    </p:extLst>
-  </p:cSld>
-  <p:clrMapOvr>
-    <a:masterClrMapping/>
-  </p:clrMapOvr>
-</p:notes>
-</file>
-
-<file path=ppt/notesSlides/notesSlide15.xml><?xml version="1.0" encoding="utf-8"?>
-<p:notes xmlns:a="http://schemas.openxmlformats.org/drawingml/2006/main" xmlns:r="http://schemas.openxmlformats.org/officeDocument/2006/relationships" xmlns:p="http://schemas.openxmlformats.org/presentationml/2006/main">
-  <p:cSld>
-    <p:spTree>
-      <p:nvGrpSpPr>
-        <p:cNvPr id="1" name=""/>
-        <p:cNvGrpSpPr/>
-        <p:nvPr/>
-      </p:nvGrpSpPr>
-      <p:grpSpPr>
-        <a:xfrm>
-          <a:off x="0" y="0"/>
-          <a:ext cx="0" cy="0"/>
-          <a:chOff x="0" y="0"/>
-          <a:chExt cx="0" cy="0"/>
-        </a:xfrm>
-      </p:grpSpPr>
-      <p:sp>
-        <p:nvSpPr>
-          <p:cNvPr id="2" name="Slide Image Placeholder 1"/>
-          <p:cNvSpPr>
-            <a:spLocks noGrp="1" noRot="1" noChangeAspect="1"/>
-          </p:cNvSpPr>
-          <p:nvPr>
-            <p:ph type="sldImg"/>
-          </p:nvPr>
-        </p:nvSpPr>
-        <p:spPr/>
-      </p:sp>
-      <p:sp>
-        <p:nvSpPr>
-          <p:cNvPr id="3" name="Notes Placeholder 2"/>
-          <p:cNvSpPr>
-            <a:spLocks noGrp="1"/>
-          </p:cNvSpPr>
-          <p:nvPr>
-            <p:ph type="body" idx="1"/>
-          </p:nvPr>
-        </p:nvSpPr>
-        <p:spPr/>
-        <p:txBody>
-          <a:bodyPr/>
-          <a:lstStyle/>
-          <a:p>
-            <a:endParaRPr lang="en-US"/>
-          </a:p>
-        </p:txBody>
-      </p:sp>
-      <p:sp>
-        <p:nvSpPr>
-          <p:cNvPr id="4" name="Slide Number Placeholder 3"/>
-          <p:cNvSpPr>
-            <a:spLocks noGrp="1"/>
-          </p:cNvSpPr>
-          <p:nvPr>
-            <p:ph type="sldNum" sz="quarter" idx="10"/>
-          </p:nvPr>
-        </p:nvSpPr>
-        <p:spPr/>
-        <p:txBody>
-          <a:bodyPr/>
-          <a:lstStyle/>
-          <a:p>
-            <a:pPr>
-              <a:defRPr/>
-            </a:pPr>
-            <a:fld id="{4881675A-82DA-48EF-9B86-3CC2752D2CAE}" type="slidenum">
-              <a:rPr lang="en-US" smtClean="0"/>
-              <a:pPr>
-                <a:defRPr/>
-              </a:pPr>
-              <a:t>15</a:t>
-            </a:fld>
-            <a:endParaRPr lang="en-US" dirty="0"/>
-          </a:p>
-        </p:txBody>
-      </p:sp>
-    </p:spTree>
-    <p:extLst>
-      <p:ext uri="{BB962C8B-B14F-4D97-AF65-F5344CB8AC3E}">
-        <p14:creationId xmlns:p14="http://schemas.microsoft.com/office/powerpoint/2010/main" val="4143181700"/>
-      </p:ext>
-    </p:extLst>
-  </p:cSld>
-  <p:clrMapOvr>
-    <a:masterClrMapping/>
-  </p:clrMapOvr>
-</p:notes>
-</file>
-
-<file path=ppt/notesSlides/notesSlide16.xml><?xml version="1.0" encoding="utf-8"?>
-<p:notes xmlns:a="http://schemas.openxmlformats.org/drawingml/2006/main" xmlns:r="http://schemas.openxmlformats.org/officeDocument/2006/relationships" xmlns:p="http://schemas.openxmlformats.org/presentationml/2006/main">
-  <p:cSld>
-    <p:spTree>
-      <p:nvGrpSpPr>
-        <p:cNvPr id="1" name=""/>
-        <p:cNvGrpSpPr/>
-        <p:nvPr/>
-      </p:nvGrpSpPr>
-      <p:grpSpPr>
-        <a:xfrm>
-          <a:off x="0" y="0"/>
-          <a:ext cx="0" cy="0"/>
-          <a:chOff x="0" y="0"/>
-          <a:chExt cx="0" cy="0"/>
-        </a:xfrm>
-      </p:grpSpPr>
-      <p:sp>
-        <p:nvSpPr>
-          <p:cNvPr id="2" name="Slide Image Placeholder 1"/>
-          <p:cNvSpPr>
-            <a:spLocks noGrp="1" noRot="1" noChangeAspect="1"/>
-          </p:cNvSpPr>
-          <p:nvPr>
-            <p:ph type="sldImg"/>
-          </p:nvPr>
-        </p:nvSpPr>
-        <p:spPr/>
-      </p:sp>
-      <p:sp>
-        <p:nvSpPr>
-          <p:cNvPr id="3" name="Notes Placeholder 2"/>
-          <p:cNvSpPr>
-            <a:spLocks noGrp="1"/>
-          </p:cNvSpPr>
-          <p:nvPr>
-            <p:ph type="body" idx="1"/>
-          </p:nvPr>
-        </p:nvSpPr>
-        <p:spPr/>
-        <p:txBody>
-          <a:bodyPr/>
-          <a:lstStyle/>
-          <a:p>
-            <a:endParaRPr lang="en-US"/>
-          </a:p>
-        </p:txBody>
-      </p:sp>
-      <p:sp>
-        <p:nvSpPr>
-          <p:cNvPr id="4" name="Slide Number Placeholder 3"/>
-          <p:cNvSpPr>
-            <a:spLocks noGrp="1"/>
-          </p:cNvSpPr>
-          <p:nvPr>
-            <p:ph type="sldNum" sz="quarter" idx="10"/>
-          </p:nvPr>
-        </p:nvSpPr>
-        <p:spPr/>
-        <p:txBody>
-          <a:bodyPr/>
-          <a:lstStyle/>
-          <a:p>
-            <a:pPr>
-              <a:defRPr/>
-            </a:pPr>
-            <a:fld id="{4881675A-82DA-48EF-9B86-3CC2752D2CAE}" type="slidenum">
-              <a:rPr lang="en-US" smtClean="0"/>
-              <a:pPr>
-                <a:defRPr/>
-              </a:pPr>
-              <a:t>16</a:t>
-            </a:fld>
-            <a:endParaRPr lang="en-US" dirty="0"/>
-          </a:p>
-        </p:txBody>
-      </p:sp>
-    </p:spTree>
-    <p:extLst>
-      <p:ext uri="{BB962C8B-B14F-4D97-AF65-F5344CB8AC3E}">
-        <p14:creationId xmlns:p14="http://schemas.microsoft.com/office/powerpoint/2010/main" val="1017217496"/>
-      </p:ext>
-    </p:extLst>
-  </p:cSld>
-  <p:clrMapOvr>
-    <a:masterClrMapping/>
-  </p:clrMapOvr>
-</p:notes>
-</file>
-
-<file path=ppt/notesSlides/notesSlide17.xml><?xml version="1.0" encoding="utf-8"?>
-<p:notes xmlns:a="http://schemas.openxmlformats.org/drawingml/2006/main" xmlns:r="http://schemas.openxmlformats.org/officeDocument/2006/relationships" xmlns:p="http://schemas.openxmlformats.org/presentationml/2006/main">
-  <p:cSld>
-    <p:spTree>
-      <p:nvGrpSpPr>
-        <p:cNvPr id="1" name=""/>
-        <p:cNvGrpSpPr/>
-        <p:nvPr/>
-      </p:nvGrpSpPr>
-      <p:grpSpPr>
-        <a:xfrm>
-          <a:off x="0" y="0"/>
-          <a:ext cx="0" cy="0"/>
-          <a:chOff x="0" y="0"/>
-          <a:chExt cx="0" cy="0"/>
-        </a:xfrm>
-      </p:grpSpPr>
-      <p:sp>
-        <p:nvSpPr>
-          <p:cNvPr id="2" name="Slide Image Placeholder 1"/>
-          <p:cNvSpPr>
-            <a:spLocks noGrp="1" noRot="1" noChangeAspect="1"/>
-          </p:cNvSpPr>
-          <p:nvPr>
-            <p:ph type="sldImg"/>
-          </p:nvPr>
-        </p:nvSpPr>
-        <p:spPr/>
-      </p:sp>
-      <p:sp>
-        <p:nvSpPr>
-          <p:cNvPr id="3" name="Notes Placeholder 2"/>
-          <p:cNvSpPr>
-            <a:spLocks noGrp="1"/>
-          </p:cNvSpPr>
-          <p:nvPr>
-            <p:ph type="body" idx="1"/>
-          </p:nvPr>
-        </p:nvSpPr>
-        <p:spPr/>
-        <p:txBody>
-          <a:bodyPr/>
-          <a:lstStyle/>
-          <a:p>
-            <a:endParaRPr lang="en-US"/>
-          </a:p>
-        </p:txBody>
-      </p:sp>
-      <p:sp>
-        <p:nvSpPr>
-          <p:cNvPr id="4" name="Slide Number Placeholder 3"/>
-          <p:cNvSpPr>
-            <a:spLocks noGrp="1"/>
-          </p:cNvSpPr>
-          <p:nvPr>
-            <p:ph type="sldNum" sz="quarter" idx="10"/>
-          </p:nvPr>
-        </p:nvSpPr>
-        <p:spPr/>
-        <p:txBody>
-          <a:bodyPr/>
-          <a:lstStyle/>
-          <a:p>
-            <a:pPr>
-              <a:defRPr/>
-            </a:pPr>
-            <a:fld id="{4881675A-82DA-48EF-9B86-3CC2752D2CAE}" type="slidenum">
-              <a:rPr lang="en-US" smtClean="0"/>
-              <a:pPr>
-                <a:defRPr/>
-              </a:pPr>
-              <a:t>17</a:t>
-            </a:fld>
-            <a:endParaRPr lang="en-US" dirty="0"/>
-          </a:p>
-        </p:txBody>
-      </p:sp>
-    </p:spTree>
-    <p:extLst>
-      <p:ext uri="{BB962C8B-B14F-4D97-AF65-F5344CB8AC3E}">
-        <p14:creationId xmlns:p14="http://schemas.microsoft.com/office/powerpoint/2010/main" val="2655314279"/>
-      </p:ext>
-    </p:extLst>
-  </p:cSld>
-  <p:clrMapOvr>
-    <a:masterClrMapping/>
-  </p:clrMapOvr>
-</p:notes>
-</file>
-
-<file path=ppt/notesSlides/notesSlide18.xml><?xml version="1.0" encoding="utf-8"?>
-<p:notes xmlns:a="http://schemas.openxmlformats.org/drawingml/2006/main" xmlns:r="http://schemas.openxmlformats.org/officeDocument/2006/relationships" xmlns:p="http://schemas.openxmlformats.org/presentationml/2006/main">
-  <p:cSld>
-    <p:spTree>
-      <p:nvGrpSpPr>
-        <p:cNvPr id="1" name=""/>
-        <p:cNvGrpSpPr/>
-        <p:nvPr/>
-      </p:nvGrpSpPr>
-      <p:grpSpPr>
-        <a:xfrm>
-          <a:off x="0" y="0"/>
-          <a:ext cx="0" cy="0"/>
-          <a:chOff x="0" y="0"/>
-          <a:chExt cx="0" cy="0"/>
-        </a:xfrm>
-      </p:grpSpPr>
-      <p:sp>
-        <p:nvSpPr>
-          <p:cNvPr id="2" name="Slide Image Placeholder 1"/>
-          <p:cNvSpPr>
-            <a:spLocks noGrp="1" noRot="1" noChangeAspect="1"/>
-          </p:cNvSpPr>
-          <p:nvPr>
-            <p:ph type="sldImg"/>
-          </p:nvPr>
-        </p:nvSpPr>
-        <p:spPr/>
-      </p:sp>
-      <p:sp>
-        <p:nvSpPr>
-          <p:cNvPr id="3" name="Notes Placeholder 2"/>
-          <p:cNvSpPr>
-            <a:spLocks noGrp="1"/>
-          </p:cNvSpPr>
-          <p:nvPr>
-            <p:ph type="body" idx="1"/>
-          </p:nvPr>
-        </p:nvSpPr>
-        <p:spPr/>
-        <p:txBody>
-          <a:bodyPr/>
-          <a:lstStyle/>
-          <a:p>
-            <a:endParaRPr lang="en-US"/>
-          </a:p>
-        </p:txBody>
-      </p:sp>
-      <p:sp>
-        <p:nvSpPr>
-          <p:cNvPr id="4" name="Slide Number Placeholder 3"/>
-          <p:cNvSpPr>
-            <a:spLocks noGrp="1"/>
-          </p:cNvSpPr>
-          <p:nvPr>
-            <p:ph type="sldNum" sz="quarter" idx="10"/>
-          </p:nvPr>
-        </p:nvSpPr>
-        <p:spPr/>
-        <p:txBody>
-          <a:bodyPr/>
-          <a:lstStyle/>
-          <a:p>
-            <a:pPr>
-              <a:defRPr/>
-            </a:pPr>
-            <a:fld id="{4881675A-82DA-48EF-9B86-3CC2752D2CAE}" type="slidenum">
-              <a:rPr lang="en-US" smtClean="0"/>
-              <a:pPr>
-                <a:defRPr/>
-              </a:pPr>
-              <a:t>18</a:t>
-            </a:fld>
-            <a:endParaRPr lang="en-US" dirty="0"/>
-          </a:p>
-        </p:txBody>
-      </p:sp>
-    </p:spTree>
-    <p:extLst>
-      <p:ext uri="{BB962C8B-B14F-4D97-AF65-F5344CB8AC3E}">
-        <p14:creationId xmlns:p14="http://schemas.microsoft.com/office/powerpoint/2010/main" val="1536383159"/>
-      </p:ext>
-    </p:extLst>
-  </p:cSld>
-  <p:clrMapOvr>
-    <a:masterClrMapping/>
-  </p:clrMapOvr>
-</p:notes>
-</file>
-
-<file path=ppt/notesSlides/notesSlide19.xml><?xml version="1.0" encoding="utf-8"?>
-<p:notes xmlns:a="http://schemas.openxmlformats.org/drawingml/2006/main" xmlns:r="http://schemas.openxmlformats.org/officeDocument/2006/relationships" xmlns:p="http://schemas.openxmlformats.org/presentationml/2006/main">
-  <p:cSld>
-    <p:spTree>
-      <p:nvGrpSpPr>
-        <p:cNvPr id="1" name=""/>
-        <p:cNvGrpSpPr/>
-        <p:nvPr/>
-      </p:nvGrpSpPr>
-      <p:grpSpPr>
-        <a:xfrm>
-          <a:off x="0" y="0"/>
-          <a:ext cx="0" cy="0"/>
-          <a:chOff x="0" y="0"/>
-          <a:chExt cx="0" cy="0"/>
-        </a:xfrm>
-      </p:grpSpPr>
-      <p:sp>
-        <p:nvSpPr>
-          <p:cNvPr id="2" name="Slide Image Placeholder 1"/>
-          <p:cNvSpPr>
-            <a:spLocks noGrp="1" noRot="1" noChangeAspect="1"/>
-          </p:cNvSpPr>
-          <p:nvPr>
-            <p:ph type="sldImg"/>
-          </p:nvPr>
-        </p:nvSpPr>
-        <p:spPr/>
-      </p:sp>
-      <p:sp>
-        <p:nvSpPr>
-          <p:cNvPr id="3" name="Notes Placeholder 2"/>
-          <p:cNvSpPr>
-            <a:spLocks noGrp="1"/>
-          </p:cNvSpPr>
-          <p:nvPr>
-            <p:ph type="body" idx="1"/>
-          </p:nvPr>
-        </p:nvSpPr>
-        <p:spPr/>
-        <p:txBody>
-          <a:bodyPr/>
-          <a:lstStyle/>
-          <a:p>
-            <a:endParaRPr lang="en-US"/>
-          </a:p>
-        </p:txBody>
-      </p:sp>
-      <p:sp>
-        <p:nvSpPr>
-          <p:cNvPr id="4" name="Slide Number Placeholder 3"/>
-          <p:cNvSpPr>
-            <a:spLocks noGrp="1"/>
-          </p:cNvSpPr>
-          <p:nvPr>
-            <p:ph type="sldNum" sz="quarter" idx="10"/>
-          </p:nvPr>
-        </p:nvSpPr>
-        <p:spPr/>
-        <p:txBody>
-          <a:bodyPr/>
-          <a:lstStyle/>
-          <a:p>
-            <a:pPr>
-              <a:defRPr/>
-            </a:pPr>
-            <a:fld id="{4881675A-82DA-48EF-9B86-3CC2752D2CAE}" type="slidenum">
-              <a:rPr lang="en-US" smtClean="0"/>
-              <a:pPr>
-                <a:defRPr/>
-              </a:pPr>
-              <a:t>19</a:t>
-            </a:fld>
-            <a:endParaRPr lang="en-US" dirty="0"/>
-          </a:p>
-        </p:txBody>
-      </p:sp>
-    </p:spTree>
-    <p:extLst>
-      <p:ext uri="{BB962C8B-B14F-4D97-AF65-F5344CB8AC3E}">
-        <p14:creationId xmlns:p14="http://schemas.microsoft.com/office/powerpoint/2010/main" val="3229984369"/>
-      </p:ext>
-    </p:extLst>
-  </p:cSld>
-  <p:clrMapOvr>
-    <a:masterClrMapping/>
-  </p:clrMapOvr>
-</p:notes>
-</file>
-
-<file path=ppt/notesSlides/notesSlide2.xml><?xml version="1.0" encoding="utf-8"?>
-<p:notes xmlns:a="http://schemas.openxmlformats.org/drawingml/2006/main" xmlns:r="http://schemas.openxmlformats.org/officeDocument/2006/relationships" xmlns:p="http://schemas.openxmlformats.org/presentationml/2006/main">
-  <p:cSld>
-    <p:spTree>
-      <p:nvGrpSpPr>
-        <p:cNvPr id="1" name=""/>
-        <p:cNvGrpSpPr/>
-        <p:nvPr/>
-      </p:nvGrpSpPr>
-      <p:grpSpPr>
-        <a:xfrm>
-          <a:off x="0" y="0"/>
-          <a:ext cx="0" cy="0"/>
-          <a:chOff x="0" y="0"/>
-          <a:chExt cx="0" cy="0"/>
-        </a:xfrm>
-      </p:grpSpPr>
-      <p:sp>
-        <p:nvSpPr>
-          <p:cNvPr id="2" name="Slide Image Placeholder 1"/>
-          <p:cNvSpPr>
-            <a:spLocks noGrp="1" noRot="1" noChangeAspect="1"/>
-          </p:cNvSpPr>
-          <p:nvPr>
-            <p:ph type="sldImg"/>
-          </p:nvPr>
-        </p:nvSpPr>
-        <p:spPr/>
-      </p:sp>
-      <p:sp>
-        <p:nvSpPr>
-          <p:cNvPr id="3" name="Notes Placeholder 2"/>
-          <p:cNvSpPr>
-            <a:spLocks noGrp="1"/>
-          </p:cNvSpPr>
-          <p:nvPr>
-            <p:ph type="body" idx="1"/>
-          </p:nvPr>
-        </p:nvSpPr>
-        <p:spPr/>
-        <p:txBody>
-          <a:bodyPr/>
-          <a:lstStyle/>
-          <a:p>
-            <a:endParaRPr lang="en-US"/>
-          </a:p>
-        </p:txBody>
-      </p:sp>
-      <p:sp>
-        <p:nvSpPr>
-          <p:cNvPr id="4" name="Slide Number Placeholder 3"/>
-          <p:cNvSpPr>
-            <a:spLocks noGrp="1"/>
-          </p:cNvSpPr>
-          <p:nvPr>
-            <p:ph type="sldNum" sz="quarter" idx="10"/>
-          </p:nvPr>
-        </p:nvSpPr>
-        <p:spPr/>
-        <p:txBody>
-          <a:bodyPr/>
-          <a:lstStyle/>
-          <a:p>
-            <a:pPr>
-              <a:defRPr/>
-            </a:pPr>
-            <a:fld id="{4881675A-82DA-48EF-9B86-3CC2752D2CAE}" type="slidenum">
-              <a:rPr lang="en-US" smtClean="0"/>
-              <a:pPr>
-                <a:defRPr/>
-              </a:pPr>
-              <a:t>2</a:t>
-            </a:fld>
-            <a:endParaRPr lang="en-US" dirty="0"/>
-          </a:p>
-        </p:txBody>
-      </p:sp>
-    </p:spTree>
-    <p:extLst>
-      <p:ext uri="{BB962C8B-B14F-4D97-AF65-F5344CB8AC3E}">
-        <p14:creationId xmlns:p14="http://schemas.microsoft.com/office/powerpoint/2010/main" val="2924197802"/>
-      </p:ext>
-    </p:extLst>
-  </p:cSld>
-  <p:clrMapOvr>
-    <a:masterClrMapping/>
-  </p:clrMapOvr>
-</p:notes>
-</file>
-
-<file path=ppt/notesSlides/notesSlide20.xml><?xml version="1.0" encoding="utf-8"?>
-<p:notes xmlns:a="http://schemas.openxmlformats.org/drawingml/2006/main" xmlns:r="http://schemas.openxmlformats.org/officeDocument/2006/relationships" xmlns:p="http://schemas.openxmlformats.org/presentationml/2006/main">
-  <p:cSld>
-    <p:spTree>
-      <p:nvGrpSpPr>
-        <p:cNvPr id="1" name=""/>
-        <p:cNvGrpSpPr/>
-        <p:nvPr/>
-      </p:nvGrpSpPr>
-      <p:grpSpPr>
-        <a:xfrm>
-          <a:off x="0" y="0"/>
-          <a:ext cx="0" cy="0"/>
-          <a:chOff x="0" y="0"/>
-          <a:chExt cx="0" cy="0"/>
-        </a:xfrm>
-      </p:grpSpPr>
-      <p:sp>
-        <p:nvSpPr>
-          <p:cNvPr id="2" name="Slide Image Placeholder 1"/>
-          <p:cNvSpPr>
-            <a:spLocks noGrp="1" noRot="1" noChangeAspect="1"/>
-          </p:cNvSpPr>
-          <p:nvPr>
-            <p:ph type="sldImg"/>
-          </p:nvPr>
-        </p:nvSpPr>
-        <p:spPr/>
-      </p:sp>
-      <p:sp>
-        <p:nvSpPr>
-          <p:cNvPr id="3" name="Notes Placeholder 2"/>
-          <p:cNvSpPr>
-            <a:spLocks noGrp="1"/>
-          </p:cNvSpPr>
-          <p:nvPr>
-            <p:ph type="body" idx="1"/>
-          </p:nvPr>
-        </p:nvSpPr>
-        <p:spPr/>
-        <p:txBody>
-          <a:bodyPr/>
-          <a:lstStyle/>
-          <a:p>
-            <a:endParaRPr lang="en-US"/>
-          </a:p>
-        </p:txBody>
-      </p:sp>
-      <p:sp>
-        <p:nvSpPr>
-          <p:cNvPr id="4" name="Slide Number Placeholder 3"/>
-          <p:cNvSpPr>
-            <a:spLocks noGrp="1"/>
-          </p:cNvSpPr>
-          <p:nvPr>
-            <p:ph type="sldNum" sz="quarter" idx="10"/>
-          </p:nvPr>
-        </p:nvSpPr>
-        <p:spPr/>
-        <p:txBody>
-          <a:bodyPr/>
-          <a:lstStyle/>
-          <a:p>
-            <a:pPr>
-              <a:defRPr/>
-            </a:pPr>
-            <a:fld id="{4881675A-82DA-48EF-9B86-3CC2752D2CAE}" type="slidenum">
-              <a:rPr lang="en-US" smtClean="0"/>
-              <a:pPr>
-                <a:defRPr/>
-              </a:pPr>
-              <a:t>52</a:t>
-            </a:fld>
-            <a:endParaRPr lang="en-US" dirty="0"/>
-          </a:p>
-        </p:txBody>
-      </p:sp>
-    </p:spTree>
-    <p:extLst>
-      <p:ext uri="{BB962C8B-B14F-4D97-AF65-F5344CB8AC3E}">
-        <p14:creationId xmlns:p14="http://schemas.microsoft.com/office/powerpoint/2010/main" val="3585313048"/>
-      </p:ext>
-    </p:extLst>
-  </p:cSld>
-  <p:clrMapOvr>
-    <a:masterClrMapping/>
-  </p:clrMapOvr>
-</p:notes>
-</file>
-
-<file path=ppt/notesSlides/notesSlide21.xml><?xml version="1.0" encoding="utf-8"?>
-<p:notes xmlns:a="http://schemas.openxmlformats.org/drawingml/2006/main" xmlns:r="http://schemas.openxmlformats.org/officeDocument/2006/relationships" xmlns:p="http://schemas.openxmlformats.org/presentationml/2006/main">
-  <p:cSld>
-    <p:spTree>
-      <p:nvGrpSpPr>
-        <p:cNvPr id="1" name=""/>
-        <p:cNvGrpSpPr/>
-        <p:nvPr/>
-      </p:nvGrpSpPr>
-      <p:grpSpPr>
-        <a:xfrm>
-          <a:off x="0" y="0"/>
-          <a:ext cx="0" cy="0"/>
-          <a:chOff x="0" y="0"/>
-          <a:chExt cx="0" cy="0"/>
-        </a:xfrm>
-      </p:grpSpPr>
-      <p:sp>
-        <p:nvSpPr>
-          <p:cNvPr id="2" name="Slide Image Placeholder 1"/>
-          <p:cNvSpPr>
-            <a:spLocks noGrp="1" noRot="1" noChangeAspect="1"/>
-          </p:cNvSpPr>
-          <p:nvPr>
-            <p:ph type="sldImg"/>
-          </p:nvPr>
-        </p:nvSpPr>
-        <p:spPr/>
-      </p:sp>
-      <p:sp>
-        <p:nvSpPr>
-          <p:cNvPr id="3" name="Notes Placeholder 2"/>
-          <p:cNvSpPr>
-            <a:spLocks noGrp="1"/>
-          </p:cNvSpPr>
-          <p:nvPr>
-            <p:ph type="body" idx="1"/>
-          </p:nvPr>
-        </p:nvSpPr>
-        <p:spPr/>
-        <p:txBody>
-          <a:bodyPr/>
-          <a:lstStyle/>
-          <a:p>
-            <a:endParaRPr lang="en-US"/>
-          </a:p>
-        </p:txBody>
-      </p:sp>
-      <p:sp>
-        <p:nvSpPr>
-          <p:cNvPr id="4" name="Slide Number Placeholder 3"/>
-          <p:cNvSpPr>
-            <a:spLocks noGrp="1"/>
-          </p:cNvSpPr>
-          <p:nvPr>
-            <p:ph type="sldNum" sz="quarter" idx="10"/>
-          </p:nvPr>
-        </p:nvSpPr>
-        <p:spPr/>
-        <p:txBody>
-          <a:bodyPr/>
-          <a:lstStyle/>
-          <a:p>
-            <a:pPr>
-              <a:defRPr/>
-            </a:pPr>
-            <a:fld id="{4881675A-82DA-48EF-9B86-3CC2752D2CAE}" type="slidenum">
-              <a:rPr lang="en-US" smtClean="0"/>
-              <a:pPr>
-                <a:defRPr/>
-              </a:pPr>
-              <a:t>53</a:t>
-            </a:fld>
-            <a:endParaRPr lang="en-US" dirty="0"/>
-          </a:p>
-        </p:txBody>
-      </p:sp>
-    </p:spTree>
-    <p:extLst>
-      <p:ext uri="{BB962C8B-B14F-4D97-AF65-F5344CB8AC3E}">
-        <p14:creationId xmlns:p14="http://schemas.microsoft.com/office/powerpoint/2010/main" val="3730033982"/>
-      </p:ext>
-    </p:extLst>
-  </p:cSld>
-  <p:clrMapOvr>
-    <a:masterClrMapping/>
-  </p:clrMapOvr>
-</p:notes>
-</file>
-
-<file path=ppt/notesSlides/notesSlide22.xml><?xml version="1.0" encoding="utf-8"?>
-<p:notes xmlns:a="http://schemas.openxmlformats.org/drawingml/2006/main" xmlns:r="http://schemas.openxmlformats.org/officeDocument/2006/relationships" xmlns:p="http://schemas.openxmlformats.org/presentationml/2006/main">
-  <p:cSld>
-    <p:spTree>
-      <p:nvGrpSpPr>
-        <p:cNvPr id="1" name=""/>
-        <p:cNvGrpSpPr/>
-        <p:nvPr/>
-      </p:nvGrpSpPr>
-      <p:grpSpPr>
-        <a:xfrm>
-          <a:off x="0" y="0"/>
-          <a:ext cx="0" cy="0"/>
-          <a:chOff x="0" y="0"/>
-          <a:chExt cx="0" cy="0"/>
-        </a:xfrm>
-      </p:grpSpPr>
-      <p:sp>
-        <p:nvSpPr>
-          <p:cNvPr id="2" name="Slide Image Placeholder 1"/>
-          <p:cNvSpPr>
-            <a:spLocks noGrp="1" noRot="1" noChangeAspect="1"/>
-          </p:cNvSpPr>
-          <p:nvPr>
-            <p:ph type="sldImg"/>
-          </p:nvPr>
-        </p:nvSpPr>
-        <p:spPr/>
-      </p:sp>
-      <p:sp>
-        <p:nvSpPr>
-          <p:cNvPr id="3" name="Notes Placeholder 2"/>
-          <p:cNvSpPr>
-            <a:spLocks noGrp="1"/>
-          </p:cNvSpPr>
-          <p:nvPr>
-            <p:ph type="body" idx="1"/>
-          </p:nvPr>
-        </p:nvSpPr>
-        <p:spPr/>
-        <p:txBody>
-          <a:bodyPr/>
-          <a:lstStyle/>
-          <a:p>
-            <a:endParaRPr lang="en-US"/>
-          </a:p>
-        </p:txBody>
-      </p:sp>
-      <p:sp>
-        <p:nvSpPr>
-          <p:cNvPr id="4" name="Slide Number Placeholder 3"/>
-          <p:cNvSpPr>
-            <a:spLocks noGrp="1"/>
-          </p:cNvSpPr>
-          <p:nvPr>
-            <p:ph type="sldNum" sz="quarter" idx="10"/>
-          </p:nvPr>
-        </p:nvSpPr>
-        <p:spPr/>
-        <p:txBody>
-          <a:bodyPr/>
-          <a:lstStyle/>
-          <a:p>
-            <a:pPr>
-              <a:defRPr/>
-            </a:pPr>
-            <a:fld id="{4881675A-82DA-48EF-9B86-3CC2752D2CAE}" type="slidenum">
-              <a:rPr lang="en-US" smtClean="0"/>
-              <a:pPr>
-                <a:defRPr/>
-              </a:pPr>
-              <a:t>54</a:t>
-            </a:fld>
-            <a:endParaRPr lang="en-US" dirty="0"/>
-          </a:p>
-        </p:txBody>
-      </p:sp>
-    </p:spTree>
-    <p:extLst>
-      <p:ext uri="{BB962C8B-B14F-4D97-AF65-F5344CB8AC3E}">
-        <p14:creationId xmlns:p14="http://schemas.microsoft.com/office/powerpoint/2010/main" val="2186038289"/>
-      </p:ext>
-    </p:extLst>
-  </p:cSld>
-  <p:clrMapOvr>
-    <a:masterClrMapping/>
-  </p:clrMapOvr>
-</p:notes>
-</file>
-
-<file path=ppt/notesSlides/notesSlide23.xml><?xml version="1.0" encoding="utf-8"?>
-<p:notes xmlns:a="http://schemas.openxmlformats.org/drawingml/2006/main" xmlns:r="http://schemas.openxmlformats.org/officeDocument/2006/relationships" xmlns:p="http://schemas.openxmlformats.org/presentationml/2006/main">
-  <p:cSld>
-    <p:spTree>
-      <p:nvGrpSpPr>
-        <p:cNvPr id="1" name=""/>
-        <p:cNvGrpSpPr/>
-        <p:nvPr/>
-      </p:nvGrpSpPr>
-      <p:grpSpPr>
-        <a:xfrm>
-          <a:off x="0" y="0"/>
-          <a:ext cx="0" cy="0"/>
-          <a:chOff x="0" y="0"/>
-          <a:chExt cx="0" cy="0"/>
-        </a:xfrm>
-      </p:grpSpPr>
-      <p:sp>
-        <p:nvSpPr>
-          <p:cNvPr id="2" name="Slide Image Placeholder 1"/>
-          <p:cNvSpPr>
-            <a:spLocks noGrp="1" noRot="1" noChangeAspect="1"/>
-          </p:cNvSpPr>
-          <p:nvPr>
-            <p:ph type="sldImg"/>
-          </p:nvPr>
-        </p:nvSpPr>
-        <p:spPr/>
-      </p:sp>
-      <p:sp>
-        <p:nvSpPr>
-          <p:cNvPr id="3" name="Notes Placeholder 2"/>
-          <p:cNvSpPr>
-            <a:spLocks noGrp="1"/>
-          </p:cNvSpPr>
-          <p:nvPr>
-            <p:ph type="body" idx="1"/>
-          </p:nvPr>
-        </p:nvSpPr>
-        <p:spPr/>
-        <p:txBody>
-          <a:bodyPr/>
-          <a:lstStyle/>
-          <a:p>
-            <a:endParaRPr lang="en-US"/>
-          </a:p>
-        </p:txBody>
-      </p:sp>
-      <p:sp>
-        <p:nvSpPr>
-          <p:cNvPr id="4" name="Slide Number Placeholder 3"/>
-          <p:cNvSpPr>
-            <a:spLocks noGrp="1"/>
-          </p:cNvSpPr>
-          <p:nvPr>
-            <p:ph type="sldNum" sz="quarter" idx="10"/>
-          </p:nvPr>
-        </p:nvSpPr>
-        <p:spPr/>
-        <p:txBody>
-          <a:bodyPr/>
-          <a:lstStyle/>
-          <a:p>
-            <a:pPr>
-              <a:defRPr/>
-            </a:pPr>
-            <a:fld id="{4881675A-82DA-48EF-9B86-3CC2752D2CAE}" type="slidenum">
-              <a:rPr lang="en-US" smtClean="0"/>
-              <a:pPr>
-                <a:defRPr/>
-              </a:pPr>
-              <a:t>55</a:t>
-            </a:fld>
-            <a:endParaRPr lang="en-US" dirty="0"/>
-          </a:p>
-        </p:txBody>
-      </p:sp>
-    </p:spTree>
-    <p:extLst>
-      <p:ext uri="{BB962C8B-B14F-4D97-AF65-F5344CB8AC3E}">
-        <p14:creationId xmlns:p14="http://schemas.microsoft.com/office/powerpoint/2010/main" val="471063563"/>
-      </p:ext>
-    </p:extLst>
-  </p:cSld>
-  <p:clrMapOvr>
-    <a:masterClrMapping/>
-  </p:clrMapOvr>
-</p:notes>
-</file>
-
-<file path=ppt/notesSlides/notesSlide3.xml><?xml version="1.0" encoding="utf-8"?>
-<p:notes xmlns:a="http://schemas.openxmlformats.org/drawingml/2006/main" xmlns:r="http://schemas.openxmlformats.org/officeDocument/2006/relationships" xmlns:p="http://schemas.openxmlformats.org/presentationml/2006/main">
-  <p:cSld>
-    <p:spTree>
-      <p:nvGrpSpPr>
-        <p:cNvPr id="1" name=""/>
-        <p:cNvGrpSpPr/>
-        <p:nvPr/>
-      </p:nvGrpSpPr>
-      <p:grpSpPr>
-        <a:xfrm>
-          <a:off x="0" y="0"/>
-          <a:ext cx="0" cy="0"/>
-          <a:chOff x="0" y="0"/>
-          <a:chExt cx="0" cy="0"/>
-        </a:xfrm>
-      </p:grpSpPr>
-      <p:sp>
-        <p:nvSpPr>
-          <p:cNvPr id="2" name="Slide Image Placeholder 1"/>
-          <p:cNvSpPr>
-            <a:spLocks noGrp="1" noRot="1" noChangeAspect="1"/>
-          </p:cNvSpPr>
-          <p:nvPr>
-            <p:ph type="sldImg"/>
-          </p:nvPr>
-        </p:nvSpPr>
-        <p:spPr/>
-      </p:sp>
-      <p:sp>
-        <p:nvSpPr>
-          <p:cNvPr id="3" name="Notes Placeholder 2"/>
-          <p:cNvSpPr>
-            <a:spLocks noGrp="1"/>
-          </p:cNvSpPr>
-          <p:nvPr>
-            <p:ph type="body" idx="1"/>
-          </p:nvPr>
-        </p:nvSpPr>
-        <p:spPr/>
-        <p:txBody>
-          <a:bodyPr/>
-          <a:lstStyle/>
-          <a:p>
-            <a:endParaRPr lang="en-US"/>
-          </a:p>
-        </p:txBody>
-      </p:sp>
-      <p:sp>
-        <p:nvSpPr>
-          <p:cNvPr id="4" name="Slide Number Placeholder 3"/>
-          <p:cNvSpPr>
-            <a:spLocks noGrp="1"/>
-          </p:cNvSpPr>
-          <p:nvPr>
-            <p:ph type="sldNum" sz="quarter" idx="10"/>
-          </p:nvPr>
-        </p:nvSpPr>
-        <p:spPr/>
-        <p:txBody>
-          <a:bodyPr/>
-          <a:lstStyle/>
-          <a:p>
-            <a:pPr>
-              <a:defRPr/>
-            </a:pPr>
-            <a:fld id="{4881675A-82DA-48EF-9B86-3CC2752D2CAE}" type="slidenum">
-              <a:rPr lang="en-US" smtClean="0"/>
-              <a:pPr>
-                <a:defRPr/>
-              </a:pPr>
-              <a:t>3</a:t>
-            </a:fld>
-            <a:endParaRPr lang="en-US" dirty="0"/>
-          </a:p>
-        </p:txBody>
-      </p:sp>
-    </p:spTree>
-    <p:extLst>
-      <p:ext uri="{BB962C8B-B14F-4D97-AF65-F5344CB8AC3E}">
-        <p14:creationId xmlns:p14="http://schemas.microsoft.com/office/powerpoint/2010/main" val="1093243905"/>
-      </p:ext>
-    </p:extLst>
-  </p:cSld>
-  <p:clrMapOvr>
-    <a:masterClrMapping/>
-  </p:clrMapOvr>
-</p:notes>
-</file>
-
-<file path=ppt/notesSlides/notesSlide4.xml><?xml version="1.0" encoding="utf-8"?>
-<p:notes xmlns:a="http://schemas.openxmlformats.org/drawingml/2006/main" xmlns:r="http://schemas.openxmlformats.org/officeDocument/2006/relationships" xmlns:p="http://schemas.openxmlformats.org/presentationml/2006/main">
-  <p:cSld>
-    <p:spTree>
-      <p:nvGrpSpPr>
-        <p:cNvPr id="1" name=""/>
-        <p:cNvGrpSpPr/>
-        <p:nvPr/>
-      </p:nvGrpSpPr>
-      <p:grpSpPr>
-        <a:xfrm>
-          <a:off x="0" y="0"/>
-          <a:ext cx="0" cy="0"/>
-          <a:chOff x="0" y="0"/>
-          <a:chExt cx="0" cy="0"/>
-        </a:xfrm>
-      </p:grpSpPr>
-      <p:sp>
-        <p:nvSpPr>
-          <p:cNvPr id="2" name="Slide Image Placeholder 1"/>
-          <p:cNvSpPr>
-            <a:spLocks noGrp="1" noRot="1" noChangeAspect="1"/>
-          </p:cNvSpPr>
-          <p:nvPr>
-            <p:ph type="sldImg"/>
-          </p:nvPr>
-        </p:nvSpPr>
-        <p:spPr/>
-      </p:sp>
-      <p:sp>
-        <p:nvSpPr>
-          <p:cNvPr id="3" name="Notes Placeholder 2"/>
-          <p:cNvSpPr>
-            <a:spLocks noGrp="1"/>
-          </p:cNvSpPr>
-          <p:nvPr>
-            <p:ph type="body" idx="1"/>
-          </p:nvPr>
-        </p:nvSpPr>
-        <p:spPr/>
-        <p:txBody>
-          <a:bodyPr/>
-          <a:lstStyle/>
-          <a:p>
-            <a:endParaRPr lang="en-US"/>
-          </a:p>
-        </p:txBody>
-      </p:sp>
-      <p:sp>
-        <p:nvSpPr>
-          <p:cNvPr id="4" name="Slide Number Placeholder 3"/>
-          <p:cNvSpPr>
-            <a:spLocks noGrp="1"/>
-          </p:cNvSpPr>
-          <p:nvPr>
-            <p:ph type="sldNum" sz="quarter" idx="10"/>
-          </p:nvPr>
-        </p:nvSpPr>
-        <p:spPr/>
-        <p:txBody>
-          <a:bodyPr/>
-          <a:lstStyle/>
-          <a:p>
-            <a:pPr>
-              <a:defRPr/>
-            </a:pPr>
-            <a:fld id="{4881675A-82DA-48EF-9B86-3CC2752D2CAE}" type="slidenum">
-              <a:rPr lang="en-US" smtClean="0"/>
-              <a:pPr>
-                <a:defRPr/>
-              </a:pPr>
-              <a:t>4</a:t>
-            </a:fld>
-            <a:endParaRPr lang="en-US" dirty="0"/>
-          </a:p>
-        </p:txBody>
-      </p:sp>
-    </p:spTree>
-    <p:extLst>
-      <p:ext uri="{BB962C8B-B14F-4D97-AF65-F5344CB8AC3E}">
-        <p14:creationId xmlns:p14="http://schemas.microsoft.com/office/powerpoint/2010/main" val="552511396"/>
-      </p:ext>
-    </p:extLst>
-  </p:cSld>
-  <p:clrMapOvr>
-    <a:masterClrMapping/>
-  </p:clrMapOvr>
-</p:notes>
-</file>
-
-<file path=ppt/notesSlides/notesSlide5.xml><?xml version="1.0" encoding="utf-8"?>
-<p:notes xmlns:a="http://schemas.openxmlformats.org/drawingml/2006/main" xmlns:r="http://schemas.openxmlformats.org/officeDocument/2006/relationships" xmlns:p="http://schemas.openxmlformats.org/presentationml/2006/main">
-  <p:cSld>
-    <p:spTree>
-      <p:nvGrpSpPr>
-        <p:cNvPr id="1" name=""/>
-        <p:cNvGrpSpPr/>
-        <p:nvPr/>
-      </p:nvGrpSpPr>
-      <p:grpSpPr>
-        <a:xfrm>
-          <a:off x="0" y="0"/>
-          <a:ext cx="0" cy="0"/>
-          <a:chOff x="0" y="0"/>
-          <a:chExt cx="0" cy="0"/>
-        </a:xfrm>
-      </p:grpSpPr>
-      <p:sp>
-        <p:nvSpPr>
-          <p:cNvPr id="2" name="Slide Image Placeholder 1"/>
-          <p:cNvSpPr>
-            <a:spLocks noGrp="1" noRot="1" noChangeAspect="1"/>
-          </p:cNvSpPr>
-          <p:nvPr>
-            <p:ph type="sldImg"/>
-          </p:nvPr>
-        </p:nvSpPr>
-        <p:spPr/>
-      </p:sp>
-      <p:sp>
-        <p:nvSpPr>
-          <p:cNvPr id="3" name="Notes Placeholder 2"/>
-          <p:cNvSpPr>
-            <a:spLocks noGrp="1"/>
-          </p:cNvSpPr>
-          <p:nvPr>
-            <p:ph type="body" idx="1"/>
-          </p:nvPr>
-        </p:nvSpPr>
-        <p:spPr/>
-        <p:txBody>
-          <a:bodyPr/>
-          <a:lstStyle/>
-          <a:p>
-            <a:endParaRPr lang="en-US"/>
-          </a:p>
-        </p:txBody>
-      </p:sp>
-      <p:sp>
-        <p:nvSpPr>
-          <p:cNvPr id="4" name="Slide Number Placeholder 3"/>
-          <p:cNvSpPr>
-            <a:spLocks noGrp="1"/>
-          </p:cNvSpPr>
-          <p:nvPr>
-            <p:ph type="sldNum" sz="quarter" idx="10"/>
-          </p:nvPr>
-        </p:nvSpPr>
-        <p:spPr/>
-        <p:txBody>
-          <a:bodyPr/>
-          <a:lstStyle/>
-          <a:p>
-            <a:pPr>
-              <a:defRPr/>
-            </a:pPr>
-            <a:fld id="{4881675A-82DA-48EF-9B86-3CC2752D2CAE}" type="slidenum">
-              <a:rPr lang="en-US" smtClean="0"/>
-              <a:pPr>
-                <a:defRPr/>
-              </a:pPr>
-              <a:t>5</a:t>
-            </a:fld>
-            <a:endParaRPr lang="en-US" dirty="0"/>
-          </a:p>
-        </p:txBody>
-      </p:sp>
-    </p:spTree>
-    <p:extLst>
-      <p:ext uri="{BB962C8B-B14F-4D97-AF65-F5344CB8AC3E}">
-        <p14:creationId xmlns:p14="http://schemas.microsoft.com/office/powerpoint/2010/main" val="1754825171"/>
-      </p:ext>
-    </p:extLst>
-  </p:cSld>
-  <p:clrMapOvr>
-    <a:masterClrMapping/>
-  </p:clrMapOvr>
-</p:notes>
-</file>
-
-<file path=ppt/notesSlides/notesSlide6.xml><?xml version="1.0" encoding="utf-8"?>
-<p:notes xmlns:a="http://schemas.openxmlformats.org/drawingml/2006/main" xmlns:r="http://schemas.openxmlformats.org/officeDocument/2006/relationships" xmlns:p="http://schemas.openxmlformats.org/presentationml/2006/main">
-  <p:cSld>
-    <p:spTree>
-      <p:nvGrpSpPr>
-        <p:cNvPr id="1" name=""/>
-        <p:cNvGrpSpPr/>
-        <p:nvPr/>
-      </p:nvGrpSpPr>
-      <p:grpSpPr>
-        <a:xfrm>
-          <a:off x="0" y="0"/>
-          <a:ext cx="0" cy="0"/>
-          <a:chOff x="0" y="0"/>
-          <a:chExt cx="0" cy="0"/>
-        </a:xfrm>
-      </p:grpSpPr>
-      <p:sp>
-        <p:nvSpPr>
-          <p:cNvPr id="2" name="Slide Image Placeholder 1"/>
-          <p:cNvSpPr>
-            <a:spLocks noGrp="1" noRot="1" noChangeAspect="1"/>
-          </p:cNvSpPr>
-          <p:nvPr>
-            <p:ph type="sldImg"/>
-          </p:nvPr>
-        </p:nvSpPr>
-        <p:spPr/>
-      </p:sp>
-      <p:sp>
-        <p:nvSpPr>
-          <p:cNvPr id="3" name="Notes Placeholder 2"/>
-          <p:cNvSpPr>
-            <a:spLocks noGrp="1"/>
-          </p:cNvSpPr>
-          <p:nvPr>
-            <p:ph type="body" idx="1"/>
-          </p:nvPr>
-        </p:nvSpPr>
-        <p:spPr/>
-        <p:txBody>
-          <a:bodyPr/>
-          <a:lstStyle/>
-          <a:p>
-            <a:endParaRPr lang="en-US"/>
-          </a:p>
-        </p:txBody>
-      </p:sp>
-      <p:sp>
-        <p:nvSpPr>
-          <p:cNvPr id="4" name="Slide Number Placeholder 3"/>
-          <p:cNvSpPr>
-            <a:spLocks noGrp="1"/>
-          </p:cNvSpPr>
-          <p:nvPr>
-            <p:ph type="sldNum" sz="quarter" idx="10"/>
-          </p:nvPr>
-        </p:nvSpPr>
-        <p:spPr/>
-        <p:txBody>
-          <a:bodyPr/>
-          <a:lstStyle/>
-          <a:p>
-            <a:pPr>
-              <a:defRPr/>
-            </a:pPr>
-            <a:fld id="{4881675A-82DA-48EF-9B86-3CC2752D2CAE}" type="slidenum">
-              <a:rPr lang="en-US" smtClean="0"/>
-              <a:pPr>
-                <a:defRPr/>
-              </a:pPr>
-              <a:t>6</a:t>
-            </a:fld>
-            <a:endParaRPr lang="en-US" dirty="0"/>
-          </a:p>
-        </p:txBody>
-      </p:sp>
-    </p:spTree>
-    <p:extLst>
-      <p:ext uri="{BB962C8B-B14F-4D97-AF65-F5344CB8AC3E}">
-        <p14:creationId xmlns:p14="http://schemas.microsoft.com/office/powerpoint/2010/main" val="901693555"/>
-      </p:ext>
-    </p:extLst>
-  </p:cSld>
-  <p:clrMapOvr>
-    <a:masterClrMapping/>
-  </p:clrMapOvr>
-</p:notes>
-</file>
-
-<file path=ppt/notesSlides/notesSlide7.xml><?xml version="1.0" encoding="utf-8"?>
-<p:notes xmlns:a="http://schemas.openxmlformats.org/drawingml/2006/main" xmlns:r="http://schemas.openxmlformats.org/officeDocument/2006/relationships" xmlns:p="http://schemas.openxmlformats.org/presentationml/2006/main">
-  <p:cSld>
-    <p:spTree>
-      <p:nvGrpSpPr>
-        <p:cNvPr id="1" name=""/>
-        <p:cNvGrpSpPr/>
-        <p:nvPr/>
-      </p:nvGrpSpPr>
-      <p:grpSpPr>
-        <a:xfrm>
-          <a:off x="0" y="0"/>
-          <a:ext cx="0" cy="0"/>
-          <a:chOff x="0" y="0"/>
-          <a:chExt cx="0" cy="0"/>
-        </a:xfrm>
-      </p:grpSpPr>
-      <p:sp>
-        <p:nvSpPr>
-          <p:cNvPr id="2" name="Slide Image Placeholder 1"/>
-          <p:cNvSpPr>
-            <a:spLocks noGrp="1" noRot="1" noChangeAspect="1"/>
-          </p:cNvSpPr>
-          <p:nvPr>
-            <p:ph type="sldImg"/>
-          </p:nvPr>
-        </p:nvSpPr>
-        <p:spPr/>
-      </p:sp>
-      <p:sp>
-        <p:nvSpPr>
-          <p:cNvPr id="3" name="Notes Placeholder 2"/>
-          <p:cNvSpPr>
-            <a:spLocks noGrp="1"/>
-          </p:cNvSpPr>
-          <p:nvPr>
-            <p:ph type="body" idx="1"/>
-          </p:nvPr>
-        </p:nvSpPr>
-        <p:spPr/>
-        <p:txBody>
-          <a:bodyPr/>
-          <a:lstStyle/>
-          <a:p>
-            <a:endParaRPr lang="en-US"/>
-          </a:p>
-        </p:txBody>
-      </p:sp>
-      <p:sp>
-        <p:nvSpPr>
-          <p:cNvPr id="4" name="Slide Number Placeholder 3"/>
-          <p:cNvSpPr>
-            <a:spLocks noGrp="1"/>
-          </p:cNvSpPr>
-          <p:nvPr>
-            <p:ph type="sldNum" sz="quarter" idx="10"/>
-          </p:nvPr>
-        </p:nvSpPr>
-        <p:spPr/>
-        <p:txBody>
-          <a:bodyPr/>
-          <a:lstStyle/>
-          <a:p>
-            <a:pPr>
-              <a:defRPr/>
-            </a:pPr>
-            <a:fld id="{4881675A-82DA-48EF-9B86-3CC2752D2CAE}" type="slidenum">
-              <a:rPr lang="en-US" smtClean="0"/>
-              <a:pPr>
-                <a:defRPr/>
-              </a:pPr>
-              <a:t>7</a:t>
-            </a:fld>
-            <a:endParaRPr lang="en-US" dirty="0"/>
-          </a:p>
-        </p:txBody>
-      </p:sp>
-    </p:spTree>
-    <p:extLst>
-      <p:ext uri="{BB962C8B-B14F-4D97-AF65-F5344CB8AC3E}">
-        <p14:creationId xmlns:p14="http://schemas.microsoft.com/office/powerpoint/2010/main" val="1837567417"/>
-      </p:ext>
-    </p:extLst>
-  </p:cSld>
-  <p:clrMapOvr>
-    <a:masterClrMapping/>
-  </p:clrMapOvr>
-</p:notes>
-</file>
-
-<file path=ppt/notesSlides/notesSlide8.xml><?xml version="1.0" encoding="utf-8"?>
-<p:notes xmlns:a="http://schemas.openxmlformats.org/drawingml/2006/main" xmlns:r="http://schemas.openxmlformats.org/officeDocument/2006/relationships" xmlns:p="http://schemas.openxmlformats.org/presentationml/2006/main">
-  <p:cSld>
-    <p:spTree>
-      <p:nvGrpSpPr>
-        <p:cNvPr id="1" name=""/>
-        <p:cNvGrpSpPr/>
-        <p:nvPr/>
-      </p:nvGrpSpPr>
-      <p:grpSpPr>
-        <a:xfrm>
-          <a:off x="0" y="0"/>
-          <a:ext cx="0" cy="0"/>
-          <a:chOff x="0" y="0"/>
-          <a:chExt cx="0" cy="0"/>
-        </a:xfrm>
-      </p:grpSpPr>
-      <p:sp>
-        <p:nvSpPr>
-          <p:cNvPr id="2" name="Slide Image Placeholder 1"/>
-          <p:cNvSpPr>
-            <a:spLocks noGrp="1" noRot="1" noChangeAspect="1"/>
-          </p:cNvSpPr>
-          <p:nvPr>
-            <p:ph type="sldImg"/>
-          </p:nvPr>
-        </p:nvSpPr>
-        <p:spPr/>
-      </p:sp>
-      <p:sp>
-        <p:nvSpPr>
-          <p:cNvPr id="3" name="Notes Placeholder 2"/>
-          <p:cNvSpPr>
-            <a:spLocks noGrp="1"/>
-          </p:cNvSpPr>
-          <p:nvPr>
-            <p:ph type="body" idx="1"/>
-          </p:nvPr>
-        </p:nvSpPr>
-        <p:spPr/>
-        <p:txBody>
-          <a:bodyPr/>
-          <a:lstStyle/>
-          <a:p>
-            <a:endParaRPr lang="en-US"/>
-          </a:p>
-        </p:txBody>
-      </p:sp>
-      <p:sp>
-        <p:nvSpPr>
-          <p:cNvPr id="4" name="Slide Number Placeholder 3"/>
-          <p:cNvSpPr>
-            <a:spLocks noGrp="1"/>
-          </p:cNvSpPr>
-          <p:nvPr>
-            <p:ph type="sldNum" sz="quarter" idx="10"/>
-          </p:nvPr>
-        </p:nvSpPr>
-        <p:spPr/>
-        <p:txBody>
-          <a:bodyPr/>
-          <a:lstStyle/>
-          <a:p>
-            <a:pPr>
-              <a:defRPr/>
-            </a:pPr>
-            <a:fld id="{4881675A-82DA-48EF-9B86-3CC2752D2CAE}" type="slidenum">
-              <a:rPr lang="en-US" smtClean="0"/>
-              <a:pPr>
-                <a:defRPr/>
-              </a:pPr>
-              <a:t>8</a:t>
-            </a:fld>
-            <a:endParaRPr lang="en-US" dirty="0"/>
-          </a:p>
-        </p:txBody>
-      </p:sp>
-    </p:spTree>
-    <p:extLst>
-      <p:ext uri="{BB962C8B-B14F-4D97-AF65-F5344CB8AC3E}">
-        <p14:creationId xmlns:p14="http://schemas.microsoft.com/office/powerpoint/2010/main" val="1059437174"/>
-      </p:ext>
-    </p:extLst>
-  </p:cSld>
-  <p:clrMapOvr>
-    <a:masterClrMapping/>
-  </p:clrMapOvr>
-</p:notes>
-</file>
-
-<file path=ppt/notesSlides/notesSlide9.xml><?xml version="1.0" encoding="utf-8"?>
-<p:notes xmlns:a="http://schemas.openxmlformats.org/drawingml/2006/main" xmlns:r="http://schemas.openxmlformats.org/officeDocument/2006/relationships" xmlns:p="http://schemas.openxmlformats.org/presentationml/2006/main">
-  <p:cSld>
-    <p:spTree>
-      <p:nvGrpSpPr>
-        <p:cNvPr id="1" name=""/>
-        <p:cNvGrpSpPr/>
-        <p:nvPr/>
-      </p:nvGrpSpPr>
-      <p:grpSpPr>
-        <a:xfrm>
-          <a:off x="0" y="0"/>
-          <a:ext cx="0" cy="0"/>
-          <a:chOff x="0" y="0"/>
-          <a:chExt cx="0" cy="0"/>
-        </a:xfrm>
-      </p:grpSpPr>
-      <p:sp>
-        <p:nvSpPr>
-          <p:cNvPr id="2" name="Slide Image Placeholder 1"/>
-          <p:cNvSpPr>
-            <a:spLocks noGrp="1" noRot="1" noChangeAspect="1"/>
-          </p:cNvSpPr>
-          <p:nvPr>
-            <p:ph type="sldImg"/>
-          </p:nvPr>
-        </p:nvSpPr>
-        <p:spPr/>
-      </p:sp>
-      <p:sp>
-        <p:nvSpPr>
-          <p:cNvPr id="3" name="Notes Placeholder 2"/>
-          <p:cNvSpPr>
-            <a:spLocks noGrp="1"/>
-          </p:cNvSpPr>
-          <p:nvPr>
-            <p:ph type="body" idx="1"/>
-          </p:nvPr>
-        </p:nvSpPr>
-        <p:spPr/>
-        <p:txBody>
-          <a:bodyPr/>
-          <a:lstStyle/>
-          <a:p>
-            <a:endParaRPr lang="en-US"/>
-          </a:p>
-        </p:txBody>
-      </p:sp>
-      <p:sp>
-        <p:nvSpPr>
-          <p:cNvPr id="4" name="Slide Number Placeholder 3"/>
-          <p:cNvSpPr>
-            <a:spLocks noGrp="1"/>
-          </p:cNvSpPr>
-          <p:nvPr>
-            <p:ph type="sldNum" sz="quarter" idx="10"/>
-          </p:nvPr>
-        </p:nvSpPr>
-        <p:spPr/>
-        <p:txBody>
-          <a:bodyPr/>
-          <a:lstStyle/>
-          <a:p>
-            <a:pPr>
-              <a:defRPr/>
-            </a:pPr>
-            <a:fld id="{4881675A-82DA-48EF-9B86-3CC2752D2CAE}" type="slidenum">
-              <a:rPr lang="en-US" smtClean="0"/>
-              <a:pPr>
-                <a:defRPr/>
-              </a:pPr>
-              <a:t>9</a:t>
-            </a:fld>
-            <a:endParaRPr lang="en-US" dirty="0"/>
-          </a:p>
-        </p:txBody>
-      </p:sp>
-    </p:spTree>
-    <p:extLst>
-      <p:ext uri="{BB962C8B-B14F-4D97-AF65-F5344CB8AC3E}">
-        <p14:creationId xmlns:p14="http://schemas.microsoft.com/office/powerpoint/2010/main" val="1765718837"/>
-      </p:ext>
-    </p:extLst>
-  </p:cSld>
-  <p:clrMapOvr>
-    <a:masterClrMapping/>
-  </p:clrMapOvr>
-</p:notes>
-</file>
-
 <file path=ppt/slideLayouts/slideLayout1.xml><?xml version="1.0" encoding="utf-8"?>
 <p:sldLayout xmlns:a="http://schemas.openxmlformats.org/drawingml/2006/main" xmlns:r="http://schemas.openxmlformats.org/officeDocument/2006/relationships" xmlns:p="http://schemas.openxmlformats.org/presentationml/2006/main" showMasterSp="0" type="title" preserve="1">
   <p:cSld name="Title Slide">
@@ -19113,7 +17133,7 @@
           </p:nvPr>
         </p:nvPicPr>
         <p:blipFill>
-          <a:blip r:embed="rId4" cstate="print"/>
+          <a:blip r:embed="rId3" cstate="print"/>
           <a:stretch>
             <a:fillRect/>
           </a:stretch>
@@ -19356,7 +17376,16 @@
                 </a:solidFill>
                 <a:cs typeface="Arial" charset="0"/>
               </a:rPr>
-              <a:t>Informational View</a:t>
+              <a:t>Informational </a:t>
+            </a:r>
+            <a:r>
+              <a:rPr lang="en-US" dirty="0" smtClean="0">
+                <a:solidFill>
+                  <a:srgbClr val="C00000"/>
+                </a:solidFill>
+                <a:cs typeface="Arial" charset="0"/>
+              </a:rPr>
+              <a:t>View</a:t>
             </a:r>
           </a:p>
         </p:txBody>
@@ -19372,7 +17401,7 @@
           </p:nvPr>
         </p:nvPicPr>
         <p:blipFill>
-          <a:blip r:embed="rId4" cstate="print"/>
+          <a:blip r:embed="rId3" cstate="print"/>
           <a:stretch>
             <a:fillRect/>
           </a:stretch>
@@ -19628,7 +17657,7 @@
           </p:nvPr>
         </p:nvPicPr>
         <p:blipFill>
-          <a:blip r:embed="rId4" cstate="print"/>
+          <a:blip r:embed="rId3" cstate="print"/>
           <a:stretch>
             <a:fillRect/>
           </a:stretch>
@@ -19887,7 +17916,7 @@
           </p:nvPr>
         </p:nvPicPr>
         <p:blipFill>
-          <a:blip r:embed="rId4" cstate="print"/>
+          <a:blip r:embed="rId3" cstate="print"/>
           <a:srcRect/>
           <a:stretch>
             <a:fillRect/>
@@ -20122,7 +18151,7 @@
           </p:nvPr>
         </p:nvPicPr>
         <p:blipFill>
-          <a:blip r:embed="rId4" cstate="print"/>
+          <a:blip r:embed="rId3" cstate="print"/>
           <a:stretch>
             <a:fillRect/>
           </a:stretch>
@@ -20471,7 +18500,7 @@
           <p:nvPr/>
         </p:nvPicPr>
         <p:blipFill>
-          <a:blip r:embed="rId4"/>
+          <a:blip r:embed="rId3"/>
           <a:stretch>
             <a:fillRect/>
           </a:stretch>
@@ -20797,7 +18826,7 @@
           <p:nvPr/>
         </p:nvPicPr>
         <p:blipFill>
-          <a:blip r:embed="rId4"/>
+          <a:blip r:embed="rId3"/>
           <a:stretch>
             <a:fillRect/>
           </a:stretch>
@@ -21122,7 +19151,7 @@
           <p:nvPr/>
         </p:nvPicPr>
         <p:blipFill>
-          <a:blip r:embed="rId4"/>
+          <a:blip r:embed="rId3"/>
           <a:stretch>
             <a:fillRect/>
           </a:stretch>
@@ -21506,13 +19535,6 @@
   <p:clrMapOvr>
     <a:masterClrMapping/>
   </p:clrMapOvr>
-  <p:timing>
-    <p:tnLst>
-      <p:par>
-        <p:cTn xmlns:p14="http://schemas.microsoft.com/office/powerpoint/2010/main" id="1" dur="indefinite" restart="never" nodeType="tmRoot"/>
-      </p:par>
-    </p:tnLst>
-  </p:timing>
 </p:sld>
 </file>
 
@@ -33992,7 +32014,7 @@
         </p:xfrm>
         <a:graphic>
           <a:graphicData uri="http://schemas.openxmlformats.org/drawingml/2006/diagram">
-            <dgm:relIds xmlns:dgm="http://schemas.openxmlformats.org/drawingml/2006/diagram" xmlns:r="http://schemas.openxmlformats.org/officeDocument/2006/relationships" r:dm="rId3" r:lo="rId4" r:qs="rId5" r:cs="rId6"/>
+            <dgm:relIds xmlns:dgm="http://schemas.openxmlformats.org/drawingml/2006/diagram" xmlns:r="http://schemas.openxmlformats.org/officeDocument/2006/relationships" r:dm="rId2" r:lo="rId3" r:qs="rId4" r:cs="rId5"/>
           </a:graphicData>
         </a:graphic>
       </p:graphicFrame>
@@ -34005,7 +32027,7 @@
           <p:nvPr/>
         </p:nvPicPr>
         <p:blipFill>
-          <a:blip r:embed="rId8" cstate="print">
+          <a:blip r:embed="rId7" cstate="print">
             <a:extLst>
               <a:ext uri="{28A0092B-C50C-407E-A947-70E740481C1C}">
                 <a14:useLocalDpi xmlns:a14="http://schemas.microsoft.com/office/drawing/2010/main" val="0"/>
@@ -34046,11 +32068,11 @@
           <p:nvPr/>
         </p:nvPicPr>
         <p:blipFill rotWithShape="1">
-          <a:blip r:embed="rId9" cstate="print">
+          <a:blip r:embed="rId8" cstate="print">
             <a:extLst>
               <a:ext uri="{BEBA8EAE-BF5A-486C-A8C5-ECC9F3942E4B}">
                 <a14:imgProps xmlns:a14="http://schemas.microsoft.com/office/drawing/2010/main">
-                  <a14:imgLayer r:embed="rId10">
+                  <a14:imgLayer r:embed="rId9">
                     <a14:imgEffect>
                       <a14:backgroundRemoval t="19066" b="77821" l="4280" r="96109"/>
                     </a14:imgEffect>
@@ -34172,7 +32194,7 @@
           <p:nvPr/>
         </p:nvPicPr>
         <p:blipFill>
-          <a:blip r:embed="rId11">
+          <a:blip r:embed="rId10">
             <a:extLst>
               <a:ext uri="{28A0092B-C50C-407E-A947-70E740481C1C}">
                 <a14:useLocalDpi xmlns:a14="http://schemas.microsoft.com/office/drawing/2010/main" val="0"/>
@@ -34261,11 +32283,11 @@
           <p:nvPr/>
         </p:nvPicPr>
         <p:blipFill>
-          <a:blip r:embed="rId12" cstate="print">
+          <a:blip r:embed="rId11" cstate="print">
             <a:extLst>
               <a:ext uri="{BEBA8EAE-BF5A-486C-A8C5-ECC9F3942E4B}">
                 <a14:imgProps xmlns:a14="http://schemas.microsoft.com/office/drawing/2010/main">
-                  <a14:imgLayer r:embed="rId13">
+                  <a14:imgLayer r:embed="rId12">
                     <a14:imgEffect>
                       <a14:backgroundRemoval t="0" b="98995" l="0" r="100000"/>
                     </a14:imgEffect>
@@ -35459,8 +33481,23 @@
                 </a:solidFill>
                 <a:cs typeface="Arial" charset="0"/>
               </a:rPr>
-              <a:t>key takeaway</a:t>
-            </a:r>
+              <a:t>key </a:t>
+            </a:r>
+            <a:r>
+              <a:rPr lang="en-US" sz="6000" dirty="0" smtClean="0">
+                <a:solidFill>
+                  <a:srgbClr val="C00000"/>
+                </a:solidFill>
+                <a:cs typeface="Arial" charset="0"/>
+              </a:rPr>
+              <a:t>takeaway</a:t>
+            </a:r>
+            <a:endParaRPr lang="en-US" sz="6000" dirty="0" smtClean="0">
+              <a:solidFill>
+                <a:srgbClr val="C00000"/>
+              </a:solidFill>
+              <a:cs typeface="Arial" charset="0"/>
+            </a:endParaRPr>
           </a:p>
         </p:txBody>
       </p:sp>
@@ -35999,13 +34036,6 @@
   <p:clrMapOvr>
     <a:masterClrMapping/>
   </p:clrMapOvr>
-  <p:timing>
-    <p:tnLst>
-      <p:par>
-        <p:cTn xmlns:p14="http://schemas.microsoft.com/office/powerpoint/2010/main" id="1" dur="indefinite" restart="never" nodeType="tmRoot"/>
-      </p:par>
-    </p:tnLst>
-  </p:timing>
 </p:sld>
 </file>
 
@@ -36047,7 +34077,15 @@
                   <a:srgbClr val="FF0000"/>
                 </a:solidFill>
               </a:rPr>
-              <a:t>Key Takeaway</a:t>
+              <a:t>Key </a:t>
+            </a:r>
+            <a:r>
+              <a:rPr lang="en-US" dirty="0" smtClean="0">
+                <a:solidFill>
+                  <a:srgbClr val="FF0000"/>
+                </a:solidFill>
+              </a:rPr>
+              <a:t>Takeaway</a:t>
             </a:r>
             <a:endParaRPr lang="en-US" dirty="0">
               <a:solidFill>
@@ -36169,13 +34207,6 @@
   <p:clrMapOvr>
     <a:masterClrMapping/>
   </p:clrMapOvr>
-  <p:timing>
-    <p:tnLst>
-      <p:par>
-        <p:cTn xmlns:p14="http://schemas.microsoft.com/office/powerpoint/2010/main" id="1" dur="indefinite" restart="never" nodeType="tmRoot"/>
-      </p:par>
-    </p:tnLst>
-  </p:timing>
 </p:sld>
 </file>
 
@@ -36248,7 +34279,7 @@
         </p:xfrm>
         <a:graphic>
           <a:graphicData uri="http://schemas.openxmlformats.org/drawingml/2006/diagram">
-            <dgm:relIds xmlns:dgm="http://schemas.openxmlformats.org/drawingml/2006/diagram" xmlns:r="http://schemas.openxmlformats.org/officeDocument/2006/relationships" r:dm="rId3" r:lo="rId4" r:qs="rId5" r:cs="rId6"/>
+            <dgm:relIds xmlns:dgm="http://schemas.openxmlformats.org/drawingml/2006/diagram" xmlns:r="http://schemas.openxmlformats.org/officeDocument/2006/relationships" r:dm="rId2" r:lo="rId3" r:qs="rId4" r:cs="rId5"/>
           </a:graphicData>
         </a:graphic>
       </p:graphicFrame>
@@ -36261,7 +34292,7 @@
           <p:nvPr/>
         </p:nvPicPr>
         <p:blipFill>
-          <a:blip r:embed="rId8" cstate="print">
+          <a:blip r:embed="rId7" cstate="print">
             <a:extLst>
               <a:ext uri="{28A0092B-C50C-407E-A947-70E740481C1C}">
                 <a14:useLocalDpi xmlns:a14="http://schemas.microsoft.com/office/drawing/2010/main" val="0"/>
@@ -36302,12 +34333,12 @@
           <p:nvPr/>
         </p:nvPicPr>
         <p:blipFill rotWithShape="1">
-          <a:blip r:embed="rId9" cstate="print">
+          <a:blip r:embed="rId8" cstate="print">
             <a:alphaModFix amt="20000"/>
             <a:extLst>
               <a:ext uri="{BEBA8EAE-BF5A-486C-A8C5-ECC9F3942E4B}">
                 <a14:imgProps xmlns:a14="http://schemas.microsoft.com/office/drawing/2010/main">
-                  <a14:imgLayer r:embed="rId10">
+                  <a14:imgLayer r:embed="rId9">
                     <a14:imgEffect>
                       <a14:backgroundRemoval t="19066" b="77821" l="4280" r="96109"/>
                     </a14:imgEffect>
@@ -36429,7 +34460,7 @@
           <p:nvPr/>
         </p:nvPicPr>
         <p:blipFill>
-          <a:blip r:embed="rId11">
+          <a:blip r:embed="rId10">
             <a:extLst>
               <a:ext uri="{28A0092B-C50C-407E-A947-70E740481C1C}">
                 <a14:useLocalDpi xmlns:a14="http://schemas.microsoft.com/office/drawing/2010/main" val="0"/>
@@ -36470,12 +34501,12 @@
           <p:nvPr/>
         </p:nvPicPr>
         <p:blipFill>
-          <a:blip r:embed="rId12" cstate="print">
+          <a:blip r:embed="rId11" cstate="print">
             <a:alphaModFix amt="20000"/>
             <a:extLst>
               <a:ext uri="{BEBA8EAE-BF5A-486C-A8C5-ECC9F3942E4B}">
                 <a14:imgProps xmlns:a14="http://schemas.microsoft.com/office/drawing/2010/main">
-                  <a14:imgLayer r:embed="rId13">
+                  <a14:imgLayer r:embed="rId12">
                     <a14:imgEffect>
                       <a14:backgroundRemoval t="0" b="98995" l="0" r="100000"/>
                     </a14:imgEffect>
@@ -36675,11 +34706,11 @@
           <p:nvPr/>
         </p:nvPicPr>
         <p:blipFill rotWithShape="1">
-          <a:blip r:embed="rId14">
+          <a:blip r:embed="rId13">
             <a:extLst>
               <a:ext uri="{BEBA8EAE-BF5A-486C-A8C5-ECC9F3942E4B}">
                 <a14:imgProps xmlns:a14="http://schemas.microsoft.com/office/drawing/2010/main">
-                  <a14:imgLayer r:embed="rId15">
+                  <a14:imgLayer r:embed="rId14">
                     <a14:imgEffect>
                       <a14:backgroundRemoval t="21262" b="60465" l="23824" r="72206">
                         <a14:foregroundMark x1="70735" y1="53821" x2="49265" y2="54153"/>
@@ -36850,7 +34881,7 @@
         </p:xfrm>
         <a:graphic>
           <a:graphicData uri="http://schemas.openxmlformats.org/drawingml/2006/diagram">
-            <dgm:relIds xmlns:dgm="http://schemas.openxmlformats.org/drawingml/2006/diagram" xmlns:r="http://schemas.openxmlformats.org/officeDocument/2006/relationships" r:dm="rId3" r:lo="rId4" r:qs="rId5" r:cs="rId6"/>
+            <dgm:relIds xmlns:dgm="http://schemas.openxmlformats.org/drawingml/2006/diagram" xmlns:r="http://schemas.openxmlformats.org/officeDocument/2006/relationships" r:dm="rId2" r:lo="rId3" r:qs="rId4" r:cs="rId5"/>
           </a:graphicData>
         </a:graphic>
       </p:graphicFrame>
@@ -36863,7 +34894,7 @@
           <p:nvPr/>
         </p:nvPicPr>
         <p:blipFill>
-          <a:blip r:embed="rId8" cstate="print">
+          <a:blip r:embed="rId7" cstate="print">
             <a:extLst>
               <a:ext uri="{28A0092B-C50C-407E-A947-70E740481C1C}">
                 <a14:useLocalDpi xmlns:a14="http://schemas.microsoft.com/office/drawing/2010/main" val="0"/>
@@ -36904,12 +34935,12 @@
           <p:nvPr/>
         </p:nvPicPr>
         <p:blipFill rotWithShape="1">
-          <a:blip r:embed="rId9" cstate="print">
+          <a:blip r:embed="rId8" cstate="print">
             <a:alphaModFix amt="20000"/>
             <a:extLst>
               <a:ext uri="{BEBA8EAE-BF5A-486C-A8C5-ECC9F3942E4B}">
                 <a14:imgProps xmlns:a14="http://schemas.microsoft.com/office/drawing/2010/main">
-                  <a14:imgLayer r:embed="rId10">
+                  <a14:imgLayer r:embed="rId9">
                     <a14:imgEffect>
                       <a14:backgroundRemoval t="19066" b="77821" l="4280" r="96109"/>
                     </a14:imgEffect>
@@ -37031,7 +35062,7 @@
           <p:nvPr/>
         </p:nvPicPr>
         <p:blipFill>
-          <a:blip r:embed="rId11">
+          <a:blip r:embed="rId10">
             <a:extLst>
               <a:ext uri="{28A0092B-C50C-407E-A947-70E740481C1C}">
                 <a14:useLocalDpi xmlns:a14="http://schemas.microsoft.com/office/drawing/2010/main" val="0"/>
@@ -37072,12 +35103,12 @@
           <p:nvPr/>
         </p:nvPicPr>
         <p:blipFill>
-          <a:blip r:embed="rId12" cstate="print">
+          <a:blip r:embed="rId11" cstate="print">
             <a:alphaModFix amt="20000"/>
             <a:extLst>
               <a:ext uri="{BEBA8EAE-BF5A-486C-A8C5-ECC9F3942E4B}">
                 <a14:imgProps xmlns:a14="http://schemas.microsoft.com/office/drawing/2010/main">
-                  <a14:imgLayer r:embed="rId13">
+                  <a14:imgLayer r:embed="rId12">
                     <a14:imgEffect>
                       <a14:backgroundRemoval t="0" b="98995" l="0" r="100000"/>
                     </a14:imgEffect>
@@ -37277,11 +35308,11 @@
           <p:nvPr/>
         </p:nvPicPr>
         <p:blipFill rotWithShape="1">
-          <a:blip r:embed="rId14">
+          <a:blip r:embed="rId13">
             <a:extLst>
               <a:ext uri="{BEBA8EAE-BF5A-486C-A8C5-ECC9F3942E4B}">
                 <a14:imgProps xmlns:a14="http://schemas.microsoft.com/office/drawing/2010/main">
-                  <a14:imgLayer r:embed="rId15">
+                  <a14:imgLayer r:embed="rId14">
                     <a14:imgEffect>
                       <a14:backgroundRemoval t="21262" b="60465" l="23824" r="72206">
                         <a14:foregroundMark x1="70735" y1="53821" x2="49265" y2="54153"/>
@@ -37318,7 +35349,7 @@
           <p:nvPr/>
         </p:nvPicPr>
         <p:blipFill>
-          <a:blip r:embed="rId16" cstate="print">
+          <a:blip r:embed="rId15" cstate="print">
             <a:extLst>
               <a:ext uri="{28A0092B-C50C-407E-A947-70E740481C1C}">
                 <a14:useLocalDpi xmlns:a14="http://schemas.microsoft.com/office/drawing/2010/main" val="0"/>
@@ -37428,7 +35459,7 @@
         </p:xfrm>
         <a:graphic>
           <a:graphicData uri="http://schemas.openxmlformats.org/drawingml/2006/diagram">
-            <dgm:relIds xmlns:dgm="http://schemas.openxmlformats.org/drawingml/2006/diagram" xmlns:r="http://schemas.openxmlformats.org/officeDocument/2006/relationships" r:dm="rId3" r:lo="rId4" r:qs="rId5" r:cs="rId6"/>
+            <dgm:relIds xmlns:dgm="http://schemas.openxmlformats.org/drawingml/2006/diagram" xmlns:r="http://schemas.openxmlformats.org/officeDocument/2006/relationships" r:dm="rId2" r:lo="rId3" r:qs="rId4" r:cs="rId5"/>
           </a:graphicData>
         </a:graphic>
       </p:graphicFrame>

</xml_diff>